<commit_message>
adds client server messaging example with JSON
</commit_message>
<xml_diff>
--- a/Slides/Ders 2 JSON.pptx
+++ b/Slides/Ders 2 JSON.pptx
@@ -5,7 +5,7 @@
     <p:sldMasterId id="2147483660" r:id="rId1"/>
   </p:sldMasterIdLst>
   <p:notesMasterIdLst>
-    <p:notesMasterId r:id="rId9"/>
+    <p:notesMasterId r:id="rId12"/>
   </p:notesMasterIdLst>
   <p:sldIdLst>
     <p:sldId id="256" r:id="rId2"/>
@@ -15,6 +15,9 @@
     <p:sldId id="260" r:id="rId6"/>
     <p:sldId id="261" r:id="rId7"/>
     <p:sldId id="262" r:id="rId8"/>
+    <p:sldId id="264" r:id="rId9"/>
+    <p:sldId id="263" r:id="rId10"/>
+    <p:sldId id="265" r:id="rId11"/>
   </p:sldIdLst>
   <p:sldSz cx="9144000" cy="6858000" type="screen4x3"/>
   <p:notesSz cx="6858000" cy="9144000"/>
@@ -203,7 +206,7 @@
           <a:p>
             <a:fld id="{DD4244C5-5D67-C540-97C4-F007CFC432EF}" type="datetimeFigureOut">
               <a:rPr lang="tr-TR" smtClean="0"/>
-              <a:t>9.03.2023</a:t>
+              <a:t>12.03.2023</a:t>
             </a:fld>
             <a:endParaRPr lang="tr-TR"/>
           </a:p>
@@ -602,7 +605,7 @@
           <a:p>
             <a:fld id="{26396F4E-1D0B-3F44-AA0F-A3430AE5742F}" type="datetimeFigureOut">
               <a:rPr lang="tr-TR" smtClean="0"/>
-              <a:t>9.03.2023</a:t>
+              <a:t>12.03.2023</a:t>
             </a:fld>
             <a:endParaRPr lang="tr-TR"/>
           </a:p>
@@ -772,7 +775,7 @@
           <a:p>
             <a:fld id="{26396F4E-1D0B-3F44-AA0F-A3430AE5742F}" type="datetimeFigureOut">
               <a:rPr lang="tr-TR" smtClean="0"/>
-              <a:t>9.03.2023</a:t>
+              <a:t>12.03.2023</a:t>
             </a:fld>
             <a:endParaRPr lang="tr-TR"/>
           </a:p>
@@ -952,7 +955,7 @@
           <a:p>
             <a:fld id="{26396F4E-1D0B-3F44-AA0F-A3430AE5742F}" type="datetimeFigureOut">
               <a:rPr lang="tr-TR" smtClean="0"/>
-              <a:t>9.03.2023</a:t>
+              <a:t>12.03.2023</a:t>
             </a:fld>
             <a:endParaRPr lang="tr-TR"/>
           </a:p>
@@ -1122,7 +1125,7 @@
           <a:p>
             <a:fld id="{26396F4E-1D0B-3F44-AA0F-A3430AE5742F}" type="datetimeFigureOut">
               <a:rPr lang="tr-TR" smtClean="0"/>
-              <a:t>9.03.2023</a:t>
+              <a:t>12.03.2023</a:t>
             </a:fld>
             <a:endParaRPr lang="tr-TR"/>
           </a:p>
@@ -1366,7 +1369,7 @@
           <a:p>
             <a:fld id="{26396F4E-1D0B-3F44-AA0F-A3430AE5742F}" type="datetimeFigureOut">
               <a:rPr lang="tr-TR" smtClean="0"/>
-              <a:t>9.03.2023</a:t>
+              <a:t>12.03.2023</a:t>
             </a:fld>
             <a:endParaRPr lang="tr-TR"/>
           </a:p>
@@ -1598,7 +1601,7 @@
           <a:p>
             <a:fld id="{26396F4E-1D0B-3F44-AA0F-A3430AE5742F}" type="datetimeFigureOut">
               <a:rPr lang="tr-TR" smtClean="0"/>
-              <a:t>9.03.2023</a:t>
+              <a:t>12.03.2023</a:t>
             </a:fld>
             <a:endParaRPr lang="tr-TR"/>
           </a:p>
@@ -1965,7 +1968,7 @@
           <a:p>
             <a:fld id="{26396F4E-1D0B-3F44-AA0F-A3430AE5742F}" type="datetimeFigureOut">
               <a:rPr lang="tr-TR" smtClean="0"/>
-              <a:t>9.03.2023</a:t>
+              <a:t>12.03.2023</a:t>
             </a:fld>
             <a:endParaRPr lang="tr-TR"/>
           </a:p>
@@ -2083,7 +2086,7 @@
           <a:p>
             <a:fld id="{26396F4E-1D0B-3F44-AA0F-A3430AE5742F}" type="datetimeFigureOut">
               <a:rPr lang="tr-TR" smtClean="0"/>
-              <a:t>9.03.2023</a:t>
+              <a:t>12.03.2023</a:t>
             </a:fld>
             <a:endParaRPr lang="tr-TR"/>
           </a:p>
@@ -2178,7 +2181,7 @@
           <a:p>
             <a:fld id="{26396F4E-1D0B-3F44-AA0F-A3430AE5742F}" type="datetimeFigureOut">
               <a:rPr lang="tr-TR" smtClean="0"/>
-              <a:t>9.03.2023</a:t>
+              <a:t>12.03.2023</a:t>
             </a:fld>
             <a:endParaRPr lang="tr-TR"/>
           </a:p>
@@ -2455,7 +2458,7 @@
           <a:p>
             <a:fld id="{26396F4E-1D0B-3F44-AA0F-A3430AE5742F}" type="datetimeFigureOut">
               <a:rPr lang="tr-TR" smtClean="0"/>
-              <a:t>9.03.2023</a:t>
+              <a:t>12.03.2023</a:t>
             </a:fld>
             <a:endParaRPr lang="tr-TR"/>
           </a:p>
@@ -2712,7 +2715,7 @@
           <a:p>
             <a:fld id="{26396F4E-1D0B-3F44-AA0F-A3430AE5742F}" type="datetimeFigureOut">
               <a:rPr lang="tr-TR" smtClean="0"/>
-              <a:t>9.03.2023</a:t>
+              <a:t>12.03.2023</a:t>
             </a:fld>
             <a:endParaRPr lang="tr-TR"/>
           </a:p>
@@ -2925,7 +2928,7 @@
           <a:p>
             <a:fld id="{26396F4E-1D0B-3F44-AA0F-A3430AE5742F}" type="datetimeFigureOut">
               <a:rPr lang="tr-TR" smtClean="0"/>
-              <a:t>9.03.2023</a:t>
+              <a:t>12.03.2023</a:t>
             </a:fld>
             <a:endParaRPr lang="tr-TR"/>
           </a:p>
@@ -3532,6 +3535,132 @@
 </p:sld>
 </file>
 
+<file path=ppt/slides/slide10.xml><?xml version="1.0" encoding="utf-8"?>
+<p:sld xmlns:a="http://schemas.openxmlformats.org/drawingml/2006/main" xmlns:r="http://schemas.openxmlformats.org/officeDocument/2006/relationships" xmlns:p="http://schemas.openxmlformats.org/presentationml/2006/main">
+  <p:cSld>
+    <p:spTree>
+      <p:nvGrpSpPr>
+        <p:cNvPr id="1" name=""/>
+        <p:cNvGrpSpPr/>
+        <p:nvPr/>
+      </p:nvGrpSpPr>
+      <p:grpSpPr>
+        <a:xfrm>
+          <a:off x="0" y="0"/>
+          <a:ext cx="0" cy="0"/>
+          <a:chOff x="0" y="0"/>
+          <a:chExt cx="0" cy="0"/>
+        </a:xfrm>
+      </p:grpSpPr>
+      <p:sp>
+        <p:nvSpPr>
+          <p:cNvPr id="2" name="Title 1">
+            <a:extLst>
+              <a:ext uri="{FF2B5EF4-FFF2-40B4-BE49-F238E27FC236}">
+                <a16:creationId xmlns:a16="http://schemas.microsoft.com/office/drawing/2014/main" id="{006211EF-659A-6323-9ADD-701297DED3B9}"/>
+              </a:ext>
+            </a:extLst>
+          </p:cNvPr>
+          <p:cNvSpPr>
+            <a:spLocks noGrp="1"/>
+          </p:cNvSpPr>
+          <p:nvPr>
+            <p:ph type="title"/>
+          </p:nvPr>
+        </p:nvSpPr>
+        <p:spPr/>
+        <p:txBody>
+          <a:bodyPr/>
+          <a:lstStyle/>
+          <a:p>
+            <a:r>
+              <a:rPr lang="tr-TR" dirty="0"/>
+              <a:t>JSON Doğrulama</a:t>
+            </a:r>
+          </a:p>
+        </p:txBody>
+      </p:sp>
+      <p:sp>
+        <p:nvSpPr>
+          <p:cNvPr id="3" name="Content Placeholder 2">
+            <a:extLst>
+              <a:ext uri="{FF2B5EF4-FFF2-40B4-BE49-F238E27FC236}">
+                <a16:creationId xmlns:a16="http://schemas.microsoft.com/office/drawing/2014/main" id="{9A69C43D-1133-1038-C6C2-54341DB335BD}"/>
+              </a:ext>
+            </a:extLst>
+          </p:cNvPr>
+          <p:cNvSpPr>
+            <a:spLocks noGrp="1"/>
+          </p:cNvSpPr>
+          <p:nvPr>
+            <p:ph idx="1"/>
+          </p:nvPr>
+        </p:nvSpPr>
+        <p:spPr/>
+        <p:txBody>
+          <a:bodyPr/>
+          <a:lstStyle/>
+          <a:p>
+            <a:r>
+              <a:rPr lang="tr-TR" dirty="0"/>
+              <a:t>JSON dosyaları bir JSON </a:t>
+            </a:r>
+            <a:r>
+              <a:rPr lang="tr-TR" dirty="0" err="1"/>
+              <a:t>schema</a:t>
+            </a:r>
+            <a:r>
+              <a:rPr lang="tr-TR" dirty="0"/>
+              <a:t> (şema) dosyası ile doğrulanabilir.</a:t>
+            </a:r>
+          </a:p>
+          <a:p>
+            <a:r>
+              <a:rPr lang="tr-TR" dirty="0"/>
+              <a:t>Bir JSON dosyasının doğrulanabilmesi için öncelikle JSON dosyasının sentaktik (</a:t>
+            </a:r>
+            <a:r>
+              <a:rPr lang="tr-TR" dirty="0" err="1"/>
+              <a:t>syntactic</a:t>
+            </a:r>
+            <a:r>
+              <a:rPr lang="tr-TR" dirty="0"/>
+              <a:t>) olarak doğru biçimli olması gerekir.</a:t>
+            </a:r>
+          </a:p>
+          <a:p>
+            <a:r>
+              <a:rPr lang="tr-TR" dirty="0"/>
+              <a:t>Eğer dosya sentaks olarak doğru ve JSON şema dosyasına uygunsa dosya doğrulanabilir.</a:t>
+            </a:r>
+          </a:p>
+          <a:p>
+            <a:r>
+              <a:rPr lang="tr-TR" dirty="0">
+                <a:hlinkClick r:id="rId2"/>
+              </a:rPr>
+              <a:t>https://www.jsonschemavalidator.net</a:t>
+            </a:r>
+            <a:endParaRPr lang="tr-TR"/>
+          </a:p>
+          <a:p>
+            <a:endParaRPr lang="tr-TR" dirty="0"/>
+          </a:p>
+        </p:txBody>
+      </p:sp>
+    </p:spTree>
+    <p:extLst>
+      <p:ext uri="{BB962C8B-B14F-4D97-AF65-F5344CB8AC3E}">
+        <p14:creationId xmlns:p14="http://schemas.microsoft.com/office/powerpoint/2010/main" val="2908866401"/>
+      </p:ext>
+    </p:extLst>
+  </p:cSld>
+  <p:clrMapOvr>
+    <a:masterClrMapping/>
+  </p:clrMapOvr>
+</p:sld>
+</file>
+
 <file path=ppt/slides/slide2.xml><?xml version="1.0" encoding="utf-8"?>
 <p:sld xmlns:a="http://schemas.openxmlformats.org/drawingml/2006/main" xmlns:r="http://schemas.openxmlformats.org/officeDocument/2006/relationships" xmlns:p="http://schemas.openxmlformats.org/presentationml/2006/main">
   <p:cSld>
@@ -3760,7 +3889,7 @@
             </a:r>
             <a:r>
               <a:rPr lang="en-US" dirty="0"/>
-              <a:t> ECMA-262'nın </a:t>
+              <a:t> ECMA-262'nin </a:t>
             </a:r>
             <a:r>
               <a:rPr lang="en-US" dirty="0" err="1"/>
@@ -4935,7 +5064,7 @@
             </a:r>
             <a:r>
               <a:rPr lang="tr-TR" dirty="0"/>
-              <a:t> JSON karşılığı… </a:t>
+              <a:t> JSON karşılığına bakalım… </a:t>
             </a:r>
           </a:p>
         </p:txBody>
@@ -4944,6 +5073,748 @@
     <p:extLst>
       <p:ext uri="{BB962C8B-B14F-4D97-AF65-F5344CB8AC3E}">
         <p14:creationId xmlns:p14="http://schemas.microsoft.com/office/powerpoint/2010/main" val="1226807574"/>
+      </p:ext>
+    </p:extLst>
+  </p:cSld>
+  <p:clrMapOvr>
+    <a:masterClrMapping/>
+  </p:clrMapOvr>
+</p:sld>
+</file>
+
+<file path=ppt/slides/slide8.xml><?xml version="1.0" encoding="utf-8"?>
+<p:sld xmlns:a="http://schemas.openxmlformats.org/drawingml/2006/main" xmlns:r="http://schemas.openxmlformats.org/officeDocument/2006/relationships" xmlns:p="http://schemas.openxmlformats.org/presentationml/2006/main">
+  <p:cSld>
+    <p:spTree>
+      <p:nvGrpSpPr>
+        <p:cNvPr id="1" name=""/>
+        <p:cNvGrpSpPr/>
+        <p:nvPr/>
+      </p:nvGrpSpPr>
+      <p:grpSpPr>
+        <a:xfrm>
+          <a:off x="0" y="0"/>
+          <a:ext cx="0" cy="0"/>
+          <a:chOff x="0" y="0"/>
+          <a:chExt cx="0" cy="0"/>
+        </a:xfrm>
+      </p:grpSpPr>
+      <p:sp>
+        <p:nvSpPr>
+          <p:cNvPr id="2" name="Title 1">
+            <a:extLst>
+              <a:ext uri="{FF2B5EF4-FFF2-40B4-BE49-F238E27FC236}">
+                <a16:creationId xmlns:a16="http://schemas.microsoft.com/office/drawing/2014/main" id="{11A29B41-47A6-C6CC-CA4B-2B131F43D933}"/>
+              </a:ext>
+            </a:extLst>
+          </p:cNvPr>
+          <p:cNvSpPr>
+            <a:spLocks noGrp="1"/>
+          </p:cNvSpPr>
+          <p:nvPr>
+            <p:ph type="title"/>
+          </p:nvPr>
+        </p:nvSpPr>
+        <p:spPr/>
+        <p:txBody>
+          <a:bodyPr/>
+          <a:lstStyle/>
+          <a:p>
+            <a:r>
+              <a:rPr lang="tr-TR" dirty="0"/>
+              <a:t>JSON vs. İlişkisel Model</a:t>
+            </a:r>
+          </a:p>
+        </p:txBody>
+      </p:sp>
+      <p:graphicFrame>
+        <p:nvGraphicFramePr>
+          <p:cNvPr id="4" name="Table 4">
+            <a:extLst>
+              <a:ext uri="{FF2B5EF4-FFF2-40B4-BE49-F238E27FC236}">
+                <a16:creationId xmlns:a16="http://schemas.microsoft.com/office/drawing/2014/main" id="{60942CBD-DC48-9528-CD2E-9D0D987F474C}"/>
+              </a:ext>
+            </a:extLst>
+          </p:cNvPr>
+          <p:cNvGraphicFramePr>
+            <a:graphicFrameLocks noGrp="1"/>
+          </p:cNvGraphicFramePr>
+          <p:nvPr>
+            <p:ph idx="1"/>
+            <p:extLst>
+              <p:ext uri="{D42A27DB-BD31-4B8C-83A1-F6EECF244321}">
+                <p14:modId xmlns:p14="http://schemas.microsoft.com/office/powerpoint/2010/main" val="1887303816"/>
+              </p:ext>
+            </p:extLst>
+          </p:nvPr>
+        </p:nvGraphicFramePr>
+        <p:xfrm>
+          <a:off x="628650" y="1825625"/>
+          <a:ext cx="7886700" cy="4401006"/>
+        </p:xfrm>
+        <a:graphic>
+          <a:graphicData uri="http://schemas.openxmlformats.org/drawingml/2006/table">
+            <a:tbl>
+              <a:tblPr firstRow="1" bandRow="1">
+                <a:tableStyleId>{5C22544A-7EE6-4342-B048-85BDC9FD1C3A}</a:tableStyleId>
+              </a:tblPr>
+              <a:tblGrid>
+                <a:gridCol w="2628900">
+                  <a:extLst>
+                    <a:ext uri="{9D8B030D-6E8A-4147-A177-3AD203B41FA5}">
+                      <a16:colId xmlns:a16="http://schemas.microsoft.com/office/drawing/2014/main" val="1688264033"/>
+                    </a:ext>
+                  </a:extLst>
+                </a:gridCol>
+                <a:gridCol w="2628900">
+                  <a:extLst>
+                    <a:ext uri="{9D8B030D-6E8A-4147-A177-3AD203B41FA5}">
+                      <a16:colId xmlns:a16="http://schemas.microsoft.com/office/drawing/2014/main" val="1141640323"/>
+                    </a:ext>
+                  </a:extLst>
+                </a:gridCol>
+                <a:gridCol w="2628900">
+                  <a:extLst>
+                    <a:ext uri="{9D8B030D-6E8A-4147-A177-3AD203B41FA5}">
+                      <a16:colId xmlns:a16="http://schemas.microsoft.com/office/drawing/2014/main" val="1122549219"/>
+                    </a:ext>
+                  </a:extLst>
+                </a:gridCol>
+              </a:tblGrid>
+              <a:tr h="733501">
+                <a:tc>
+                  <a:txBody>
+                    <a:bodyPr/>
+                    <a:lstStyle/>
+                    <a:p>
+                      <a:pPr algn="r"/>
+                      <a:endParaRPr lang="tr-TR" dirty="0"/>
+                    </a:p>
+                  </a:txBody>
+                  <a:tcPr anchor="ctr"/>
+                </a:tc>
+                <a:tc>
+                  <a:txBody>
+                    <a:bodyPr/>
+                    <a:lstStyle/>
+                    <a:p>
+                      <a:pPr algn="ctr"/>
+                      <a:r>
+                        <a:rPr lang="tr-TR" dirty="0"/>
+                        <a:t>İlişkisel Model</a:t>
+                      </a:r>
+                    </a:p>
+                  </a:txBody>
+                  <a:tcPr anchor="ctr"/>
+                </a:tc>
+                <a:tc>
+                  <a:txBody>
+                    <a:bodyPr/>
+                    <a:lstStyle/>
+                    <a:p>
+                      <a:pPr algn="ctr"/>
+                      <a:r>
+                        <a:rPr lang="tr-TR" dirty="0"/>
+                        <a:t>JSON</a:t>
+                      </a:r>
+                    </a:p>
+                  </a:txBody>
+                  <a:tcPr anchor="ctr"/>
+                </a:tc>
+                <a:extLst>
+                  <a:ext uri="{0D108BD9-81ED-4DB2-BD59-A6C34878D82A}">
+                    <a16:rowId xmlns:a16="http://schemas.microsoft.com/office/drawing/2014/main" val="846010894"/>
+                  </a:ext>
+                </a:extLst>
+              </a:tr>
+              <a:tr h="733501">
+                <a:tc>
+                  <a:txBody>
+                    <a:bodyPr/>
+                    <a:lstStyle/>
+                    <a:p>
+                      <a:pPr algn="r"/>
+                      <a:r>
+                        <a:rPr lang="tr-TR" dirty="0"/>
+                        <a:t>Yapı</a:t>
+                      </a:r>
+                    </a:p>
+                  </a:txBody>
+                  <a:tcPr anchor="ctr"/>
+                </a:tc>
+                <a:tc>
+                  <a:txBody>
+                    <a:bodyPr/>
+                    <a:lstStyle/>
+                    <a:p>
+                      <a:endParaRPr lang="tr-TR" dirty="0"/>
+                    </a:p>
+                  </a:txBody>
+                  <a:tcPr anchor="ctr"/>
+                </a:tc>
+                <a:tc>
+                  <a:txBody>
+                    <a:bodyPr/>
+                    <a:lstStyle/>
+                    <a:p>
+                      <a:endParaRPr lang="tr-TR"/>
+                    </a:p>
+                  </a:txBody>
+                  <a:tcPr anchor="ctr"/>
+                </a:tc>
+                <a:extLst>
+                  <a:ext uri="{0D108BD9-81ED-4DB2-BD59-A6C34878D82A}">
+                    <a16:rowId xmlns:a16="http://schemas.microsoft.com/office/drawing/2014/main" val="572390085"/>
+                  </a:ext>
+                </a:extLst>
+              </a:tr>
+              <a:tr h="733501">
+                <a:tc>
+                  <a:txBody>
+                    <a:bodyPr/>
+                    <a:lstStyle/>
+                    <a:p>
+                      <a:pPr algn="r"/>
+                      <a:r>
+                        <a:rPr lang="tr-TR" dirty="0"/>
+                        <a:t>Şema</a:t>
+                      </a:r>
+                    </a:p>
+                  </a:txBody>
+                  <a:tcPr anchor="ctr"/>
+                </a:tc>
+                <a:tc>
+                  <a:txBody>
+                    <a:bodyPr/>
+                    <a:lstStyle/>
+                    <a:p>
+                      <a:endParaRPr lang="tr-TR" dirty="0"/>
+                    </a:p>
+                  </a:txBody>
+                  <a:tcPr anchor="ctr"/>
+                </a:tc>
+                <a:tc>
+                  <a:txBody>
+                    <a:bodyPr/>
+                    <a:lstStyle/>
+                    <a:p>
+                      <a:endParaRPr lang="tr-TR"/>
+                    </a:p>
+                  </a:txBody>
+                  <a:tcPr anchor="ctr"/>
+                </a:tc>
+                <a:extLst>
+                  <a:ext uri="{0D108BD9-81ED-4DB2-BD59-A6C34878D82A}">
+                    <a16:rowId xmlns:a16="http://schemas.microsoft.com/office/drawing/2014/main" val="4156539359"/>
+                  </a:ext>
+                </a:extLst>
+              </a:tr>
+              <a:tr h="733501">
+                <a:tc>
+                  <a:txBody>
+                    <a:bodyPr/>
+                    <a:lstStyle/>
+                    <a:p>
+                      <a:pPr algn="r"/>
+                      <a:r>
+                        <a:rPr lang="tr-TR" dirty="0"/>
+                        <a:t>Sorgulama</a:t>
+                      </a:r>
+                    </a:p>
+                  </a:txBody>
+                  <a:tcPr anchor="ctr"/>
+                </a:tc>
+                <a:tc>
+                  <a:txBody>
+                    <a:bodyPr/>
+                    <a:lstStyle/>
+                    <a:p>
+                      <a:endParaRPr lang="tr-TR" dirty="0"/>
+                    </a:p>
+                  </a:txBody>
+                  <a:tcPr anchor="ctr"/>
+                </a:tc>
+                <a:tc>
+                  <a:txBody>
+                    <a:bodyPr/>
+                    <a:lstStyle/>
+                    <a:p>
+                      <a:endParaRPr lang="tr-TR"/>
+                    </a:p>
+                  </a:txBody>
+                  <a:tcPr anchor="ctr"/>
+                </a:tc>
+                <a:extLst>
+                  <a:ext uri="{0D108BD9-81ED-4DB2-BD59-A6C34878D82A}">
+                    <a16:rowId xmlns:a16="http://schemas.microsoft.com/office/drawing/2014/main" val="1997596173"/>
+                  </a:ext>
+                </a:extLst>
+              </a:tr>
+              <a:tr h="733501">
+                <a:tc>
+                  <a:txBody>
+                    <a:bodyPr/>
+                    <a:lstStyle/>
+                    <a:p>
+                      <a:pPr algn="r"/>
+                      <a:r>
+                        <a:rPr lang="tr-TR" dirty="0"/>
+                        <a:t>Sıralama</a:t>
+                      </a:r>
+                    </a:p>
+                  </a:txBody>
+                  <a:tcPr anchor="ctr"/>
+                </a:tc>
+                <a:tc>
+                  <a:txBody>
+                    <a:bodyPr/>
+                    <a:lstStyle/>
+                    <a:p>
+                      <a:endParaRPr lang="tr-TR" dirty="0"/>
+                    </a:p>
+                  </a:txBody>
+                  <a:tcPr anchor="ctr"/>
+                </a:tc>
+                <a:tc>
+                  <a:txBody>
+                    <a:bodyPr/>
+                    <a:lstStyle/>
+                    <a:p>
+                      <a:endParaRPr lang="tr-TR" dirty="0"/>
+                    </a:p>
+                  </a:txBody>
+                  <a:tcPr anchor="ctr"/>
+                </a:tc>
+                <a:extLst>
+                  <a:ext uri="{0D108BD9-81ED-4DB2-BD59-A6C34878D82A}">
+                    <a16:rowId xmlns:a16="http://schemas.microsoft.com/office/drawing/2014/main" val="1162724409"/>
+                  </a:ext>
+                </a:extLst>
+              </a:tr>
+              <a:tr h="733501">
+                <a:tc>
+                  <a:txBody>
+                    <a:bodyPr/>
+                    <a:lstStyle/>
+                    <a:p>
+                      <a:pPr algn="r"/>
+                      <a:r>
+                        <a:rPr lang="tr-TR" dirty="0"/>
+                        <a:t>Uygulama</a:t>
+                      </a:r>
+                    </a:p>
+                  </a:txBody>
+                  <a:tcPr anchor="ctr"/>
+                </a:tc>
+                <a:tc>
+                  <a:txBody>
+                    <a:bodyPr/>
+                    <a:lstStyle/>
+                    <a:p>
+                      <a:endParaRPr lang="tr-TR"/>
+                    </a:p>
+                  </a:txBody>
+                  <a:tcPr anchor="ctr"/>
+                </a:tc>
+                <a:tc>
+                  <a:txBody>
+                    <a:bodyPr/>
+                    <a:lstStyle/>
+                    <a:p>
+                      <a:endParaRPr lang="tr-TR" dirty="0"/>
+                    </a:p>
+                  </a:txBody>
+                  <a:tcPr anchor="ctr"/>
+                </a:tc>
+                <a:extLst>
+                  <a:ext uri="{0D108BD9-81ED-4DB2-BD59-A6C34878D82A}">
+                    <a16:rowId xmlns:a16="http://schemas.microsoft.com/office/drawing/2014/main" val="3527221199"/>
+                  </a:ext>
+                </a:extLst>
+              </a:tr>
+            </a:tbl>
+          </a:graphicData>
+        </a:graphic>
+      </p:graphicFrame>
+    </p:spTree>
+    <p:extLst>
+      <p:ext uri="{BB962C8B-B14F-4D97-AF65-F5344CB8AC3E}">
+        <p14:creationId xmlns:p14="http://schemas.microsoft.com/office/powerpoint/2010/main" val="1266884909"/>
+      </p:ext>
+    </p:extLst>
+  </p:cSld>
+  <p:clrMapOvr>
+    <a:masterClrMapping/>
+  </p:clrMapOvr>
+</p:sld>
+</file>
+
+<file path=ppt/slides/slide9.xml><?xml version="1.0" encoding="utf-8"?>
+<p:sld xmlns:a="http://schemas.openxmlformats.org/drawingml/2006/main" xmlns:r="http://schemas.openxmlformats.org/officeDocument/2006/relationships" xmlns:p="http://schemas.openxmlformats.org/presentationml/2006/main">
+  <p:cSld>
+    <p:spTree>
+      <p:nvGrpSpPr>
+        <p:cNvPr id="1" name=""/>
+        <p:cNvGrpSpPr/>
+        <p:nvPr/>
+      </p:nvGrpSpPr>
+      <p:grpSpPr>
+        <a:xfrm>
+          <a:off x="0" y="0"/>
+          <a:ext cx="0" cy="0"/>
+          <a:chOff x="0" y="0"/>
+          <a:chExt cx="0" cy="0"/>
+        </a:xfrm>
+      </p:grpSpPr>
+      <p:sp>
+        <p:nvSpPr>
+          <p:cNvPr id="2" name="Title 1">
+            <a:extLst>
+              <a:ext uri="{FF2B5EF4-FFF2-40B4-BE49-F238E27FC236}">
+                <a16:creationId xmlns:a16="http://schemas.microsoft.com/office/drawing/2014/main" id="{11A29B41-47A6-C6CC-CA4B-2B131F43D933}"/>
+              </a:ext>
+            </a:extLst>
+          </p:cNvPr>
+          <p:cNvSpPr>
+            <a:spLocks noGrp="1"/>
+          </p:cNvSpPr>
+          <p:nvPr>
+            <p:ph type="title"/>
+          </p:nvPr>
+        </p:nvSpPr>
+        <p:spPr/>
+        <p:txBody>
+          <a:bodyPr/>
+          <a:lstStyle/>
+          <a:p>
+            <a:r>
+              <a:rPr lang="tr-TR" dirty="0"/>
+              <a:t>JSON vs. XML</a:t>
+            </a:r>
+          </a:p>
+        </p:txBody>
+      </p:sp>
+      <p:graphicFrame>
+        <p:nvGraphicFramePr>
+          <p:cNvPr id="4" name="Table 4">
+            <a:extLst>
+              <a:ext uri="{FF2B5EF4-FFF2-40B4-BE49-F238E27FC236}">
+                <a16:creationId xmlns:a16="http://schemas.microsoft.com/office/drawing/2014/main" id="{60942CBD-DC48-9528-CD2E-9D0D987F474C}"/>
+              </a:ext>
+            </a:extLst>
+          </p:cNvPr>
+          <p:cNvGraphicFramePr>
+            <a:graphicFrameLocks noGrp="1"/>
+          </p:cNvGraphicFramePr>
+          <p:nvPr>
+            <p:ph idx="1"/>
+            <p:extLst>
+              <p:ext uri="{D42A27DB-BD31-4B8C-83A1-F6EECF244321}">
+                <p14:modId xmlns:p14="http://schemas.microsoft.com/office/powerpoint/2010/main" val="102188636"/>
+              </p:ext>
+            </p:extLst>
+          </p:nvPr>
+        </p:nvGraphicFramePr>
+        <p:xfrm>
+          <a:off x="628650" y="1825625"/>
+          <a:ext cx="7886700" cy="4401006"/>
+        </p:xfrm>
+        <a:graphic>
+          <a:graphicData uri="http://schemas.openxmlformats.org/drawingml/2006/table">
+            <a:tbl>
+              <a:tblPr firstRow="1" bandRow="1">
+                <a:tableStyleId>{5C22544A-7EE6-4342-B048-85BDC9FD1C3A}</a:tableStyleId>
+              </a:tblPr>
+              <a:tblGrid>
+                <a:gridCol w="2628900">
+                  <a:extLst>
+                    <a:ext uri="{9D8B030D-6E8A-4147-A177-3AD203B41FA5}">
+                      <a16:colId xmlns:a16="http://schemas.microsoft.com/office/drawing/2014/main" val="1688264033"/>
+                    </a:ext>
+                  </a:extLst>
+                </a:gridCol>
+                <a:gridCol w="2628900">
+                  <a:extLst>
+                    <a:ext uri="{9D8B030D-6E8A-4147-A177-3AD203B41FA5}">
+                      <a16:colId xmlns:a16="http://schemas.microsoft.com/office/drawing/2014/main" val="1141640323"/>
+                    </a:ext>
+                  </a:extLst>
+                </a:gridCol>
+                <a:gridCol w="2628900">
+                  <a:extLst>
+                    <a:ext uri="{9D8B030D-6E8A-4147-A177-3AD203B41FA5}">
+                      <a16:colId xmlns:a16="http://schemas.microsoft.com/office/drawing/2014/main" val="1122549219"/>
+                    </a:ext>
+                  </a:extLst>
+                </a:gridCol>
+              </a:tblGrid>
+              <a:tr h="733501">
+                <a:tc>
+                  <a:txBody>
+                    <a:bodyPr/>
+                    <a:lstStyle/>
+                    <a:p>
+                      <a:pPr algn="r"/>
+                      <a:endParaRPr lang="tr-TR" dirty="0"/>
+                    </a:p>
+                  </a:txBody>
+                  <a:tcPr anchor="ctr"/>
+                </a:tc>
+                <a:tc>
+                  <a:txBody>
+                    <a:bodyPr/>
+                    <a:lstStyle/>
+                    <a:p>
+                      <a:pPr algn="ctr"/>
+                      <a:r>
+                        <a:rPr lang="tr-TR" dirty="0"/>
+                        <a:t>XML</a:t>
+                      </a:r>
+                    </a:p>
+                  </a:txBody>
+                  <a:tcPr anchor="ctr"/>
+                </a:tc>
+                <a:tc>
+                  <a:txBody>
+                    <a:bodyPr/>
+                    <a:lstStyle/>
+                    <a:p>
+                      <a:pPr algn="ctr"/>
+                      <a:r>
+                        <a:rPr lang="tr-TR" dirty="0"/>
+                        <a:t>JSON</a:t>
+                      </a:r>
+                    </a:p>
+                  </a:txBody>
+                  <a:tcPr anchor="ctr"/>
+                </a:tc>
+                <a:extLst>
+                  <a:ext uri="{0D108BD9-81ED-4DB2-BD59-A6C34878D82A}">
+                    <a16:rowId xmlns:a16="http://schemas.microsoft.com/office/drawing/2014/main" val="846010894"/>
+                  </a:ext>
+                </a:extLst>
+              </a:tr>
+              <a:tr h="733501">
+                <a:tc>
+                  <a:txBody>
+                    <a:bodyPr/>
+                    <a:lstStyle/>
+                    <a:p>
+                      <a:pPr algn="r"/>
+                      <a:r>
+                        <a:rPr lang="tr-TR" dirty="0"/>
+                        <a:t>Ayrıntı seviyesi (</a:t>
+                      </a:r>
+                      <a:r>
+                        <a:rPr lang="tr-TR" dirty="0" err="1"/>
+                        <a:t>Verbosity</a:t>
+                      </a:r>
+                      <a:r>
+                        <a:rPr lang="tr-TR" dirty="0"/>
+                        <a:t>)</a:t>
+                      </a:r>
+                    </a:p>
+                  </a:txBody>
+                  <a:tcPr anchor="ctr"/>
+                </a:tc>
+                <a:tc>
+                  <a:txBody>
+                    <a:bodyPr/>
+                    <a:lstStyle/>
+                    <a:p>
+                      <a:endParaRPr lang="tr-TR" dirty="0"/>
+                    </a:p>
+                  </a:txBody>
+                  <a:tcPr anchor="ctr"/>
+                </a:tc>
+                <a:tc>
+                  <a:txBody>
+                    <a:bodyPr/>
+                    <a:lstStyle/>
+                    <a:p>
+                      <a:endParaRPr lang="tr-TR"/>
+                    </a:p>
+                  </a:txBody>
+                  <a:tcPr anchor="ctr"/>
+                </a:tc>
+                <a:extLst>
+                  <a:ext uri="{0D108BD9-81ED-4DB2-BD59-A6C34878D82A}">
+                    <a16:rowId xmlns:a16="http://schemas.microsoft.com/office/drawing/2014/main" val="572390085"/>
+                  </a:ext>
+                </a:extLst>
+              </a:tr>
+              <a:tr h="733501">
+                <a:tc>
+                  <a:txBody>
+                    <a:bodyPr/>
+                    <a:lstStyle/>
+                    <a:p>
+                      <a:pPr algn="r"/>
+                      <a:r>
+                        <a:rPr lang="tr-TR" dirty="0"/>
+                        <a:t>Karmaşıklık</a:t>
+                      </a:r>
+                    </a:p>
+                  </a:txBody>
+                  <a:tcPr anchor="ctr"/>
+                </a:tc>
+                <a:tc>
+                  <a:txBody>
+                    <a:bodyPr/>
+                    <a:lstStyle/>
+                    <a:p>
+                      <a:endParaRPr lang="tr-TR" dirty="0"/>
+                    </a:p>
+                  </a:txBody>
+                  <a:tcPr anchor="ctr"/>
+                </a:tc>
+                <a:tc>
+                  <a:txBody>
+                    <a:bodyPr/>
+                    <a:lstStyle/>
+                    <a:p>
+                      <a:endParaRPr lang="tr-TR"/>
+                    </a:p>
+                  </a:txBody>
+                  <a:tcPr anchor="ctr"/>
+                </a:tc>
+                <a:extLst>
+                  <a:ext uri="{0D108BD9-81ED-4DB2-BD59-A6C34878D82A}">
+                    <a16:rowId xmlns:a16="http://schemas.microsoft.com/office/drawing/2014/main" val="4156539359"/>
+                  </a:ext>
+                </a:extLst>
+              </a:tr>
+              <a:tr h="733501">
+                <a:tc>
+                  <a:txBody>
+                    <a:bodyPr/>
+                    <a:lstStyle/>
+                    <a:p>
+                      <a:pPr algn="r"/>
+                      <a:r>
+                        <a:rPr lang="tr-TR" dirty="0"/>
+                        <a:t>Geçerlilik (Kısıtlama)</a:t>
+                      </a:r>
+                    </a:p>
+                  </a:txBody>
+                  <a:tcPr anchor="ctr"/>
+                </a:tc>
+                <a:tc>
+                  <a:txBody>
+                    <a:bodyPr/>
+                    <a:lstStyle/>
+                    <a:p>
+                      <a:endParaRPr lang="tr-TR" dirty="0"/>
+                    </a:p>
+                  </a:txBody>
+                  <a:tcPr anchor="ctr"/>
+                </a:tc>
+                <a:tc>
+                  <a:txBody>
+                    <a:bodyPr/>
+                    <a:lstStyle/>
+                    <a:p>
+                      <a:endParaRPr lang="tr-TR"/>
+                    </a:p>
+                  </a:txBody>
+                  <a:tcPr anchor="ctr"/>
+                </a:tc>
+                <a:extLst>
+                  <a:ext uri="{0D108BD9-81ED-4DB2-BD59-A6C34878D82A}">
+                    <a16:rowId xmlns:a16="http://schemas.microsoft.com/office/drawing/2014/main" val="1997596173"/>
+                  </a:ext>
+                </a:extLst>
+              </a:tr>
+              <a:tr h="733501">
+                <a:tc>
+                  <a:txBody>
+                    <a:bodyPr/>
+                    <a:lstStyle/>
+                    <a:p>
+                      <a:pPr algn="r"/>
+                      <a:r>
+                        <a:rPr lang="tr-TR" dirty="0"/>
+                        <a:t>Programlama Arayüzü</a:t>
+                      </a:r>
+                    </a:p>
+                  </a:txBody>
+                  <a:tcPr anchor="ctr"/>
+                </a:tc>
+                <a:tc>
+                  <a:txBody>
+                    <a:bodyPr/>
+                    <a:lstStyle/>
+                    <a:p>
+                      <a:endParaRPr lang="tr-TR" dirty="0"/>
+                    </a:p>
+                  </a:txBody>
+                  <a:tcPr anchor="ctr"/>
+                </a:tc>
+                <a:tc>
+                  <a:txBody>
+                    <a:bodyPr/>
+                    <a:lstStyle/>
+                    <a:p>
+                      <a:endParaRPr lang="tr-TR" dirty="0"/>
+                    </a:p>
+                  </a:txBody>
+                  <a:tcPr anchor="ctr"/>
+                </a:tc>
+                <a:extLst>
+                  <a:ext uri="{0D108BD9-81ED-4DB2-BD59-A6C34878D82A}">
+                    <a16:rowId xmlns:a16="http://schemas.microsoft.com/office/drawing/2014/main" val="1162724409"/>
+                  </a:ext>
+                </a:extLst>
+              </a:tr>
+              <a:tr h="733501">
+                <a:tc>
+                  <a:txBody>
+                    <a:bodyPr/>
+                    <a:lstStyle/>
+                    <a:p>
+                      <a:pPr algn="r"/>
+                      <a:r>
+                        <a:rPr lang="tr-TR" dirty="0"/>
+                        <a:t>Sorgulama</a:t>
+                      </a:r>
+                    </a:p>
+                  </a:txBody>
+                  <a:tcPr anchor="ctr"/>
+                </a:tc>
+                <a:tc>
+                  <a:txBody>
+                    <a:bodyPr/>
+                    <a:lstStyle/>
+                    <a:p>
+                      <a:endParaRPr lang="tr-TR"/>
+                    </a:p>
+                  </a:txBody>
+                  <a:tcPr anchor="ctr"/>
+                </a:tc>
+                <a:tc>
+                  <a:txBody>
+                    <a:bodyPr/>
+                    <a:lstStyle/>
+                    <a:p>
+                      <a:endParaRPr lang="tr-TR" dirty="0"/>
+                    </a:p>
+                  </a:txBody>
+                  <a:tcPr anchor="ctr"/>
+                </a:tc>
+                <a:extLst>
+                  <a:ext uri="{0D108BD9-81ED-4DB2-BD59-A6C34878D82A}">
+                    <a16:rowId xmlns:a16="http://schemas.microsoft.com/office/drawing/2014/main" val="3527221199"/>
+                  </a:ext>
+                </a:extLst>
+              </a:tr>
+            </a:tbl>
+          </a:graphicData>
+        </a:graphic>
+      </p:graphicFrame>
+    </p:spTree>
+    <p:extLst>
+      <p:ext uri="{BB962C8B-B14F-4D97-AF65-F5344CB8AC3E}">
+        <p14:creationId xmlns:p14="http://schemas.microsoft.com/office/powerpoint/2010/main" val="3466367166"/>
       </p:ext>
     </p:extLst>
   </p:cSld>

</xml_diff>